<commit_message>
small update to slide deck
</commit_message>
<xml_diff>
--- a/Design Patterns - Decorator.pptx
+++ b/Design Patterns - Decorator.pptx
@@ -3553,7 +3553,7 @@
             <a:fld id="{B61BEF0D-F0BB-DE4B-95CE-6DB70DBA9567}" type="datetimeFigureOut">
               <a:rPr lang="en-US" dirty="0"/>
               <a:pPr/>
-              <a:t>9/6/2019</a:t>
+              <a:t>9/10/2019</a:t>
             </a:fld>
             <a:endParaRPr lang="en-US" dirty="0"/>
           </a:p>
@@ -3841,7 +3841,7 @@
             <a:fld id="{B61BEF0D-F0BB-DE4B-95CE-6DB70DBA9567}" type="datetimeFigureOut">
               <a:rPr lang="en-US" dirty="0"/>
               <a:pPr/>
-              <a:t>9/6/2019</a:t>
+              <a:t>9/10/2019</a:t>
             </a:fld>
             <a:endParaRPr lang="en-US" dirty="0"/>
           </a:p>
@@ -4086,7 +4086,7 @@
             <a:fld id="{B61BEF0D-F0BB-DE4B-95CE-6DB70DBA9567}" type="datetimeFigureOut">
               <a:rPr lang="en-US" dirty="0"/>
               <a:pPr/>
-              <a:t>9/6/2019</a:t>
+              <a:t>9/10/2019</a:t>
             </a:fld>
             <a:endParaRPr lang="en-US" dirty="0"/>
           </a:p>
@@ -4619,7 +4619,7 @@
             <a:fld id="{B61BEF0D-F0BB-DE4B-95CE-6DB70DBA9567}" type="datetimeFigureOut">
               <a:rPr lang="en-US" dirty="0"/>
               <a:pPr/>
-              <a:t>9/6/2019</a:t>
+              <a:t>9/10/2019</a:t>
             </a:fld>
             <a:endParaRPr lang="en-US" dirty="0"/>
           </a:p>
@@ -4864,7 +4864,7 @@
             <a:fld id="{B61BEF0D-F0BB-DE4B-95CE-6DB70DBA9567}" type="datetimeFigureOut">
               <a:rPr lang="en-US" dirty="0"/>
               <a:pPr/>
-              <a:t>9/6/2019</a:t>
+              <a:t>9/10/2019</a:t>
             </a:fld>
             <a:endParaRPr lang="en-US" dirty="0"/>
           </a:p>
@@ -5404,7 +5404,7 @@
             <a:fld id="{B61BEF0D-F0BB-DE4B-95CE-6DB70DBA9567}" type="datetimeFigureOut">
               <a:rPr lang="en-US" dirty="0"/>
               <a:pPr/>
-              <a:t>9/6/2019</a:t>
+              <a:t>9/10/2019</a:t>
             </a:fld>
             <a:endParaRPr lang="en-US" dirty="0"/>
           </a:p>
@@ -5711,7 +5711,7 @@
             <a:fld id="{B61BEF0D-F0BB-DE4B-95CE-6DB70DBA9567}" type="datetimeFigureOut">
               <a:rPr lang="en-US" dirty="0"/>
               <a:pPr/>
-              <a:t>9/6/2019</a:t>
+              <a:t>9/10/2019</a:t>
             </a:fld>
             <a:endParaRPr lang="en-US" dirty="0"/>
           </a:p>
@@ -5883,7 +5883,7 @@
             <a:fld id="{B61BEF0D-F0BB-DE4B-95CE-6DB70DBA9567}" type="datetimeFigureOut">
               <a:rPr lang="en-US" dirty="0"/>
               <a:pPr/>
-              <a:t>9/6/2019</a:t>
+              <a:t>9/10/2019</a:t>
             </a:fld>
             <a:endParaRPr lang="en-US" dirty="0"/>
           </a:p>
@@ -6060,7 +6060,7 @@
             <a:fld id="{B61BEF0D-F0BB-DE4B-95CE-6DB70DBA9567}" type="datetimeFigureOut">
               <a:rPr lang="en-US" dirty="0"/>
               <a:pPr/>
-              <a:t>9/6/2019</a:t>
+              <a:t>9/10/2019</a:t>
             </a:fld>
             <a:endParaRPr lang="en-US" dirty="0"/>
           </a:p>
@@ -6227,7 +6227,7 @@
             <a:fld id="{B61BEF0D-F0BB-DE4B-95CE-6DB70DBA9567}" type="datetimeFigureOut">
               <a:rPr lang="en-US" dirty="0"/>
               <a:pPr/>
-              <a:t>9/6/2019</a:t>
+              <a:t>9/10/2019</a:t>
             </a:fld>
             <a:endParaRPr lang="en-US" dirty="0"/>
           </a:p>
@@ -6470,7 +6470,7 @@
             <a:fld id="{B61BEF0D-F0BB-DE4B-95CE-6DB70DBA9567}" type="datetimeFigureOut">
               <a:rPr lang="en-US" dirty="0"/>
               <a:pPr/>
-              <a:t>9/6/2019</a:t>
+              <a:t>9/10/2019</a:t>
             </a:fld>
             <a:endParaRPr lang="en-US" dirty="0"/>
           </a:p>
@@ -6759,7 +6759,7 @@
             <a:fld id="{B61BEF0D-F0BB-DE4B-95CE-6DB70DBA9567}" type="datetimeFigureOut">
               <a:rPr lang="en-US" dirty="0"/>
               <a:pPr/>
-              <a:t>9/6/2019</a:t>
+              <a:t>9/10/2019</a:t>
             </a:fld>
             <a:endParaRPr lang="en-US" dirty="0"/>
           </a:p>
@@ -7186,7 +7186,7 @@
             <a:fld id="{B61BEF0D-F0BB-DE4B-95CE-6DB70DBA9567}" type="datetimeFigureOut">
               <a:rPr lang="en-US" dirty="0"/>
               <a:pPr/>
-              <a:t>9/6/2019</a:t>
+              <a:t>9/10/2019</a:t>
             </a:fld>
             <a:endParaRPr lang="en-US" dirty="0"/>
           </a:p>
@@ -7306,7 +7306,7 @@
             <a:fld id="{B61BEF0D-F0BB-DE4B-95CE-6DB70DBA9567}" type="datetimeFigureOut">
               <a:rPr lang="en-US" dirty="0"/>
               <a:pPr/>
-              <a:t>9/6/2019</a:t>
+              <a:t>9/10/2019</a:t>
             </a:fld>
             <a:endParaRPr lang="en-US" dirty="0"/>
           </a:p>
@@ -7398,7 +7398,7 @@
             <a:fld id="{B61BEF0D-F0BB-DE4B-95CE-6DB70DBA9567}" type="datetimeFigureOut">
               <a:rPr lang="en-US" dirty="0"/>
               <a:pPr/>
-              <a:t>9/6/2019</a:t>
+              <a:t>9/10/2019</a:t>
             </a:fld>
             <a:endParaRPr lang="en-US" dirty="0"/>
           </a:p>
@@ -7678,7 +7678,7 @@
             <a:fld id="{B61BEF0D-F0BB-DE4B-95CE-6DB70DBA9567}" type="datetimeFigureOut">
               <a:rPr lang="en-US" dirty="0"/>
               <a:pPr/>
-              <a:t>9/6/2019</a:t>
+              <a:t>9/10/2019</a:t>
             </a:fld>
             <a:endParaRPr lang="en-US" dirty="0"/>
           </a:p>
@@ -7966,7 +7966,7 @@
             <a:fld id="{B61BEF0D-F0BB-DE4B-95CE-6DB70DBA9567}" type="datetimeFigureOut">
               <a:rPr lang="en-US" dirty="0"/>
               <a:pPr/>
-              <a:t>9/6/2019</a:t>
+              <a:t>9/10/2019</a:t>
             </a:fld>
             <a:endParaRPr lang="en-US" dirty="0"/>
           </a:p>
@@ -8194,7 +8194,7 @@
             <a:fld id="{B61BEF0D-F0BB-DE4B-95CE-6DB70DBA9567}" type="datetimeFigureOut">
               <a:rPr lang="en-US" dirty="0"/>
               <a:pPr/>
-              <a:t>9/6/2019</a:t>
+              <a:t>9/10/2019</a:t>
             </a:fld>
             <a:endParaRPr lang="en-US" dirty="0"/>
           </a:p>
@@ -9077,6 +9077,44 @@
           </a:prstGeom>
         </p:spPr>
       </p:pic>
+      <p:sp>
+        <p:nvSpPr>
+          <p:cNvPr id="3" name="Rectangle 2">
+            <a:extLst>
+              <a:ext uri="{FF2B5EF4-FFF2-40B4-BE49-F238E27FC236}">
+                <a16:creationId xmlns:a16="http://schemas.microsoft.com/office/drawing/2014/main" id="{25EF3E6F-A862-4637-AB3E-19FB5BA2C24E}"/>
+              </a:ext>
+            </a:extLst>
+          </p:cNvPr>
+          <p:cNvSpPr/>
+          <p:nvPr/>
+        </p:nvSpPr>
+        <p:spPr>
+          <a:xfrm>
+            <a:off x="2273226" y="4694480"/>
+            <a:ext cx="7642371" cy="369332"/>
+          </a:xfrm>
+          <a:prstGeom prst="rect">
+            <a:avLst/>
+          </a:prstGeom>
+        </p:spPr>
+        <p:txBody>
+          <a:bodyPr wrap="square">
+            <a:spAutoFit/>
+          </a:bodyPr>
+          <a:lstStyle/>
+          <a:p>
+            <a:pPr algn="ctr"/>
+            <a:r>
+              <a:rPr lang="en-US" dirty="0">
+                <a:hlinkClick r:id="rId3"/>
+              </a:rPr>
+              <a:t>https://codesandbox.io/s/typescript-decorator-example-fgriu</a:t>
+            </a:r>
+            <a:endParaRPr lang="en-US" dirty="0"/>
+          </a:p>
+        </p:txBody>
+      </p:sp>
       <p:pic>
         <p:nvPicPr>
           <p:cNvPr id="8" name="Picture 7">
@@ -9092,7 +9130,7 @@
           <p:nvPr/>
         </p:nvPicPr>
         <p:blipFill>
-          <a:blip r:embed="rId3"/>
+          <a:blip r:embed="rId4"/>
           <a:stretch>
             <a:fillRect/>
           </a:stretch>
@@ -9122,7 +9160,7 @@
           <p:nvPr/>
         </p:nvPicPr>
         <p:blipFill>
-          <a:blip r:embed="rId4"/>
+          <a:blip r:embed="rId5"/>
           <a:stretch>
             <a:fillRect/>
           </a:stretch>
@@ -9259,14 +9297,105 @@
                             </p:stCondLst>
                             <p:childTnLst>
                               <p:par>
-                                <p:cTn id="11" presetID="9" presetClass="emph" presetSubtype="0" nodeType="clickEffect">
+                                <p:cTn id="11" presetID="2" presetClass="entr" presetSubtype="4" fill="hold" grpId="0" nodeType="clickEffect">
                                   <p:stCondLst>
                                     <p:cond delay="0"/>
                                   </p:stCondLst>
                                   <p:childTnLst>
                                     <p:set>
                                       <p:cBhvr>
-                                        <p:cTn id="12" dur="indefinite"/>
+                                        <p:cTn id="12" dur="1" fill="hold">
+                                          <p:stCondLst>
+                                            <p:cond delay="0"/>
+                                          </p:stCondLst>
+                                        </p:cTn>
+                                        <p:tgtEl>
+                                          <p:spTgt spid="3"/>
+                                        </p:tgtEl>
+                                        <p:attrNameLst>
+                                          <p:attrName>style.visibility</p:attrName>
+                                        </p:attrNameLst>
+                                      </p:cBhvr>
+                                      <p:to>
+                                        <p:strVal val="visible"/>
+                                      </p:to>
+                                    </p:set>
+                                    <p:anim calcmode="lin" valueType="num">
+                                      <p:cBhvr additive="base">
+                                        <p:cTn id="13" dur="500" fill="hold"/>
+                                        <p:tgtEl>
+                                          <p:spTgt spid="3"/>
+                                        </p:tgtEl>
+                                        <p:attrNameLst>
+                                          <p:attrName>ppt_x</p:attrName>
+                                        </p:attrNameLst>
+                                      </p:cBhvr>
+                                      <p:tavLst>
+                                        <p:tav tm="0">
+                                          <p:val>
+                                            <p:strVal val="#ppt_x"/>
+                                          </p:val>
+                                        </p:tav>
+                                        <p:tav tm="100000">
+                                          <p:val>
+                                            <p:strVal val="#ppt_x"/>
+                                          </p:val>
+                                        </p:tav>
+                                      </p:tavLst>
+                                    </p:anim>
+                                    <p:anim calcmode="lin" valueType="num">
+                                      <p:cBhvr additive="base">
+                                        <p:cTn id="14" dur="500" fill="hold"/>
+                                        <p:tgtEl>
+                                          <p:spTgt spid="3"/>
+                                        </p:tgtEl>
+                                        <p:attrNameLst>
+                                          <p:attrName>ppt_y</p:attrName>
+                                        </p:attrNameLst>
+                                      </p:cBhvr>
+                                      <p:tavLst>
+                                        <p:tav tm="0">
+                                          <p:val>
+                                            <p:strVal val="1+#ppt_h/2"/>
+                                          </p:val>
+                                        </p:tav>
+                                        <p:tav tm="100000">
+                                          <p:val>
+                                            <p:strVal val="#ppt_y"/>
+                                          </p:val>
+                                        </p:tav>
+                                      </p:tavLst>
+                                    </p:anim>
+                                  </p:childTnLst>
+                                </p:cTn>
+                              </p:par>
+                            </p:childTnLst>
+                          </p:cTn>
+                        </p:par>
+                      </p:childTnLst>
+                    </p:cTn>
+                  </p:par>
+                  <p:par>
+                    <p:cTn id="15" fill="hold">
+                      <p:stCondLst>
+                        <p:cond delay="indefinite"/>
+                      </p:stCondLst>
+                      <p:childTnLst>
+                        <p:par>
+                          <p:cTn id="16" fill="hold">
+                            <p:stCondLst>
+                              <p:cond delay="0"/>
+                            </p:stCondLst>
+                            <p:childTnLst>
+                              <p:par>
+                                <p:cTn id="17" presetID="9" presetClass="emph" presetSubtype="0" nodeType="clickEffect">
+                                  <p:stCondLst>
+                                    <p:cond delay="0"/>
+                                  </p:stCondLst>
+                                  <p:childTnLst>
+                                    <p:set>
+                                      <p:cBhvr>
+                                        <p:cTn id="18" dur="indefinite"/>
                                         <p:tgtEl>
                                           <p:spTgt spid="4"/>
                                         </p:tgtEl>
@@ -9280,7 +9409,7 @@
                                     </p:set>
                                     <p:animEffect filter="image" prLst="opacity: 0.5">
                                       <p:cBhvr rctx="IE">
-                                        <p:cTn id="13" dur="indefinite"/>
+                                        <p:cTn id="19" dur="indefinite"/>
                                         <p:tgtEl>
                                           <p:spTgt spid="4"/>
                                         </p:tgtEl>
@@ -9290,14 +9419,14 @@
                                 </p:cTn>
                               </p:par>
                               <p:par>
-                                <p:cTn id="14" presetID="2" presetClass="entr" presetSubtype="4" fill="hold" nodeType="withEffect">
+                                <p:cTn id="20" presetID="2" presetClass="entr" presetSubtype="4" fill="hold" nodeType="withEffect">
                                   <p:stCondLst>
                                     <p:cond delay="0"/>
                                   </p:stCondLst>
                                   <p:childTnLst>
                                     <p:set>
                                       <p:cBhvr>
-                                        <p:cTn id="15" dur="1" fill="hold">
+                                        <p:cTn id="21" dur="1" fill="hold">
                                           <p:stCondLst>
                                             <p:cond delay="0"/>
                                           </p:stCondLst>
@@ -9315,7 +9444,7 @@
                                     </p:set>
                                     <p:anim calcmode="lin" valueType="num">
                                       <p:cBhvr additive="base">
-                                        <p:cTn id="16" dur="500" fill="hold"/>
+                                        <p:cTn id="22" dur="500" fill="hold"/>
                                         <p:tgtEl>
                                           <p:spTgt spid="8"/>
                                         </p:tgtEl>
@@ -9338,7 +9467,7 @@
                                     </p:anim>
                                     <p:anim calcmode="lin" valueType="num">
                                       <p:cBhvr additive="base">
-                                        <p:cTn id="17" dur="500" fill="hold"/>
+                                        <p:cTn id="23" dur="500" fill="hold"/>
                                         <p:tgtEl>
                                           <p:spTgt spid="8"/>
                                         </p:tgtEl>
@@ -9363,14 +9492,14 @@
                                 </p:cTn>
                               </p:par>
                               <p:par>
-                                <p:cTn id="18" presetID="2" presetClass="entr" presetSubtype="4" fill="hold" nodeType="withEffect">
+                                <p:cTn id="24" presetID="2" presetClass="entr" presetSubtype="4" fill="hold" nodeType="withEffect">
                                   <p:stCondLst>
                                     <p:cond delay="0"/>
                                   </p:stCondLst>
                                   <p:childTnLst>
                                     <p:set>
                                       <p:cBhvr>
-                                        <p:cTn id="19" dur="1" fill="hold">
+                                        <p:cTn id="25" dur="1" fill="hold">
                                           <p:stCondLst>
                                             <p:cond delay="0"/>
                                           </p:stCondLst>
@@ -9388,7 +9517,7 @@
                                     </p:set>
                                     <p:anim calcmode="lin" valueType="num">
                                       <p:cBhvr additive="base">
-                                        <p:cTn id="20" dur="500" fill="hold"/>
+                                        <p:cTn id="26" dur="500" fill="hold"/>
                                         <p:tgtEl>
                                           <p:spTgt spid="9"/>
                                         </p:tgtEl>
@@ -9411,7 +9540,7 @@
                                     </p:anim>
                                     <p:anim calcmode="lin" valueType="num">
                                       <p:cBhvr additive="base">
-                                        <p:cTn id="21" dur="500" fill="hold"/>
+                                        <p:cTn id="27" dur="500" fill="hold"/>
                                         <p:tgtEl>
                                           <p:spTgt spid="9"/>
                                         </p:tgtEl>
@@ -9462,6 +9591,9 @@
         </p:cTn>
       </p:par>
     </p:tnLst>
+    <p:bldLst>
+      <p:bldP spid="3" grpId="0"/>
+    </p:bldLst>
   </p:timing>
 </p:sld>
 </file>
@@ -9740,7 +9872,7 @@
           <a:p>
             <a:r>
               <a:rPr lang="en-US" dirty="0"/>
-              <a:t>Slides &amp; </a:t>
+              <a:t>slides &amp; </a:t>
             </a:r>
             <a:r>
               <a:rPr lang="en-US" dirty="0" err="1"/>
@@ -9761,7 +9893,7 @@
           <a:p>
             <a:r>
               <a:rPr lang="en-US" dirty="0"/>
-              <a:t>Typescript example - </a:t>
+              <a:t>typescript example - </a:t>
             </a:r>
             <a:r>
               <a:rPr lang="en-US" dirty="0">

</xml_diff>